<commit_message>
fix grammar in presentation
</commit_message>
<xml_diff>
--- a/Flyweight_Proxy_Tsehelnyk.pptx
+++ b/Flyweight_Proxy_Tsehelnyk.pptx
@@ -231,7 +231,7 @@
           <a:p>
             <a:fld id="{520C53A7-011B-4B3B-8DE9-5CA2D8D4BD87}" type="datetimeFigureOut">
               <a:rPr lang="ru-RU" smtClean="0"/>
-              <a:t>14.03.2023</a:t>
+              <a:t>15.03.2023</a:t>
             </a:fld>
             <a:endParaRPr lang="ru-RU"/>
           </a:p>
@@ -678,7 +678,7 @@
           <a:effectLst/>
           <a:extLst>
             <a:ext uri="{91240B29-F687-4f45-9708-019B960494DF}">
-              <a14:hiddenLine xmlns="" xmlns:a14="http://schemas.microsoft.com/office/drawing/2010/main" w="9525">
+              <a14:hiddenLine xmlns:a14="http://schemas.microsoft.com/office/drawing/2010/main" xmlns="" w="9525">
                 <a:solidFill>
                   <a:srgbClr val="000000"/>
                 </a:solidFill>
@@ -868,7 +868,7 @@
           <a:p>
             <a:fld id="{3A953780-ED85-421E-ADC4-9E4D1F211959}" type="datetime1">
               <a:rPr lang="en-US" smtClean="0"/>
-              <a:t>3/14/2023</a:t>
+              <a:t>3/15/2023</a:t>
             </a:fld>
             <a:endParaRPr lang="en-US"/>
           </a:p>
@@ -1196,7 +1196,7 @@
           <a:p>
             <a:fld id="{780FF846-93F8-4425-A2DD-D377087B137C}" type="datetime1">
               <a:rPr lang="en-US" smtClean="0"/>
-              <a:t>3/14/2023</a:t>
+              <a:t>3/15/2023</a:t>
             </a:fld>
             <a:endParaRPr lang="en-US"/>
           </a:p>
@@ -1698,7 +1698,7 @@
           <a:p>
             <a:fld id="{2CA1BDBA-6823-482C-B6A4-72377752C56E}" type="datetime1">
               <a:rPr lang="en-US" smtClean="0"/>
-              <a:t>3/14/2023</a:t>
+              <a:t>3/15/2023</a:t>
             </a:fld>
             <a:endParaRPr lang="en-US"/>
           </a:p>
@@ -2081,7 +2081,7 @@
           <a:p>
             <a:fld id="{853483F8-302B-4B34-B9A9-3F2B31EDF41E}" type="datetime1">
               <a:rPr lang="en-US" smtClean="0"/>
-              <a:t>3/14/2023</a:t>
+              <a:t>3/15/2023</a:t>
             </a:fld>
             <a:endParaRPr lang="en-US"/>
           </a:p>
@@ -2251,7 +2251,7 @@
           <a:ln/>
           <a:extLst>
             <a:ext uri="{91240B29-F687-4f45-9708-019B960494DF}">
-              <a14:hiddenLine xmlns="" xmlns:a14="http://schemas.microsoft.com/office/drawing/2010/main" w="9525">
+              <a14:hiddenLine xmlns:a14="http://schemas.microsoft.com/office/drawing/2010/main" xmlns="" w="9525">
                 <a:solidFill>
                   <a:srgbClr val="000000"/>
                 </a:solidFill>
@@ -2367,7 +2367,7 @@
           <a:p>
             <a:fld id="{2CBE6CAF-736F-49D6-BB72-53CD5A7B431B}" type="datetime1">
               <a:rPr lang="en-US" smtClean="0"/>
-              <a:t>3/14/2023</a:t>
+              <a:t>3/15/2023</a:t>
             </a:fld>
             <a:endParaRPr lang="en-US"/>
           </a:p>
@@ -2539,7 +2539,7 @@
           <a:ln/>
           <a:extLst>
             <a:ext uri="{91240B29-F687-4f45-9708-019B960494DF}">
-              <a14:hiddenLine xmlns="" xmlns:a14="http://schemas.microsoft.com/office/drawing/2010/main" w="9525">
+              <a14:hiddenLine xmlns:a14="http://schemas.microsoft.com/office/drawing/2010/main" xmlns="" w="9525">
                 <a:solidFill>
                   <a:srgbClr val="000000"/>
                 </a:solidFill>
@@ -2665,7 +2665,7 @@
           <a:p>
             <a:fld id="{EF88DDD7-8B61-4D33-8D6E-705E94B9D239}" type="datetime1">
               <a:rPr lang="en-US" smtClean="0"/>
-              <a:t>3/14/2023</a:t>
+              <a:t>3/15/2023</a:t>
             </a:fld>
             <a:endParaRPr lang="en-US"/>
           </a:p>
@@ -2835,7 +2835,7 @@
           <a:ln/>
           <a:extLst>
             <a:ext uri="{91240B29-F687-4f45-9708-019B960494DF}">
-              <a14:hiddenLine xmlns="" xmlns:a14="http://schemas.microsoft.com/office/drawing/2010/main" w="9525">
+              <a14:hiddenLine xmlns:a14="http://schemas.microsoft.com/office/drawing/2010/main" xmlns="" w="9525">
                 <a:solidFill>
                   <a:srgbClr val="000000"/>
                 </a:solidFill>
@@ -2961,7 +2961,7 @@
           <a:p>
             <a:fld id="{10FE1F56-EC44-4497-A96F-A2206828DB87}" type="datetime1">
               <a:rPr lang="en-US" smtClean="0"/>
-              <a:t>3/14/2023</a:t>
+              <a:t>3/15/2023</a:t>
             </a:fld>
             <a:endParaRPr lang="en-US"/>
           </a:p>
@@ -3318,7 +3318,7 @@
           <a:p>
             <a:fld id="{6E1E22E4-2E7D-4D96-BB91-82AEA53F9CDD}" type="datetime1">
               <a:rPr lang="en-US" smtClean="0"/>
-              <a:t>3/14/2023</a:t>
+              <a:t>3/15/2023</a:t>
             </a:fld>
             <a:endParaRPr lang="en-US"/>
           </a:p>
@@ -3488,7 +3488,7 @@
           <a:ln/>
           <a:extLst>
             <a:ext uri="{91240B29-F687-4f45-9708-019B960494DF}">
-              <a14:hiddenLine xmlns="" xmlns:a14="http://schemas.microsoft.com/office/drawing/2010/main" w="9525">
+              <a14:hiddenLine xmlns:a14="http://schemas.microsoft.com/office/drawing/2010/main" xmlns="" w="9525">
                 <a:solidFill>
                   <a:srgbClr val="000000"/>
                 </a:solidFill>
@@ -3669,7 +3669,7 @@
           <a:p>
             <a:fld id="{F77FBCE4-96EF-4175-A805-BF65024221D9}" type="datetime1">
               <a:rPr lang="en-US" smtClean="0"/>
-              <a:t>3/14/2023</a:t>
+              <a:t>3/15/2023</a:t>
             </a:fld>
             <a:endParaRPr lang="en-US"/>
           </a:p>
@@ -3839,7 +3839,7 @@
           <a:ln/>
           <a:extLst>
             <a:ext uri="{91240B29-F687-4f45-9708-019B960494DF}">
-              <a14:hiddenLine xmlns="" xmlns:a14="http://schemas.microsoft.com/office/drawing/2010/main" w="9525">
+              <a14:hiddenLine xmlns:a14="http://schemas.microsoft.com/office/drawing/2010/main" xmlns="" w="9525">
                 <a:solidFill>
                   <a:srgbClr val="000000"/>
                 </a:solidFill>
@@ -4158,7 +4158,7 @@
           <a:p>
             <a:fld id="{1BF828B8-8BC0-4F55-8997-46B00B2D76C4}" type="datetime1">
               <a:rPr lang="en-US" smtClean="0"/>
-              <a:t>3/14/2023</a:t>
+              <a:t>3/15/2023</a:t>
             </a:fld>
             <a:endParaRPr lang="en-US"/>
           </a:p>
@@ -4328,7 +4328,7 @@
           <a:ln/>
           <a:extLst>
             <a:ext uri="{91240B29-F687-4f45-9708-019B960494DF}">
-              <a14:hiddenLine xmlns="" xmlns:a14="http://schemas.microsoft.com/office/drawing/2010/main" w="9525">
+              <a14:hiddenLine xmlns:a14="http://schemas.microsoft.com/office/drawing/2010/main" xmlns="" w="9525">
                 <a:solidFill>
                   <a:srgbClr val="000000"/>
                 </a:solidFill>
@@ -4393,7 +4393,7 @@
           <a:p>
             <a:fld id="{B94132A9-9F75-4221-B89A-9785464CB10E}" type="datetime1">
               <a:rPr lang="en-US" smtClean="0"/>
-              <a:t>3/14/2023</a:t>
+              <a:t>3/15/2023</a:t>
             </a:fld>
             <a:endParaRPr lang="en-US"/>
           </a:p>
@@ -4503,7 +4503,7 @@
           <a:p>
             <a:fld id="{AE0519B5-4D94-4D32-AACE-CEF6F7C56D5C}" type="datetime1">
               <a:rPr lang="en-US" smtClean="0"/>
-              <a:t>3/14/2023</a:t>
+              <a:t>3/15/2023</a:t>
             </a:fld>
             <a:endParaRPr lang="en-US"/>
           </a:p>
@@ -4786,7 +4786,7 @@
           <a:ln/>
           <a:extLst>
             <a:ext uri="{91240B29-F687-4f45-9708-019B960494DF}">
-              <a14:hiddenLine xmlns="" xmlns:a14="http://schemas.microsoft.com/office/drawing/2010/main" w="9525">
+              <a14:hiddenLine xmlns:a14="http://schemas.microsoft.com/office/drawing/2010/main" xmlns="" w="9525">
                 <a:solidFill>
                   <a:srgbClr val="000000"/>
                 </a:solidFill>
@@ -4983,7 +4983,7 @@
           <a:p>
             <a:fld id="{97894A05-D455-4CA4-A93A-9DC623C0DE6E}" type="datetime1">
               <a:rPr lang="en-US" smtClean="0"/>
-              <a:t>3/14/2023</a:t>
+              <a:t>3/15/2023</a:t>
             </a:fld>
             <a:endParaRPr lang="en-US"/>
           </a:p>
@@ -5306,7 +5306,7 @@
           <a:p>
             <a:fld id="{DEC13FB0-ED81-4889-9491-24BC7072676E}" type="datetime1">
               <a:rPr lang="en-US" smtClean="0"/>
-              <a:t>3/14/2023</a:t>
+              <a:t>3/15/2023</a:t>
             </a:fld>
             <a:endParaRPr lang="en-US"/>
           </a:p>
@@ -5592,7 +5592,7 @@
           <a:p>
             <a:fld id="{60CE5C65-CB3B-4731-9885-54182F74BACE}" type="datetime1">
               <a:rPr lang="en-US" smtClean="0"/>
-              <a:t>3/14/2023</a:t>
+              <a:t>3/15/2023</a:t>
             </a:fld>
             <a:endParaRPr lang="en-US"/>
           </a:p>
@@ -6067,10 +6067,10 @@
           <p:cNvPr id="9" name="Rectangle 8">
             <a:extLst>
               <a:ext uri="{FF2B5EF4-FFF2-40B4-BE49-F238E27FC236}">
-                <a16:creationId xmlns:a16="http://schemas.microsoft.com/office/drawing/2014/main" xmlns="" id="{2FE8DED1-24FF-4A79-873B-ECE3ABE73035}"/>
+                <a16:creationId xmlns="" xmlns:a16="http://schemas.microsoft.com/office/drawing/2014/main" id="{2FE8DED1-24FF-4A79-873B-ECE3ABE73035}"/>
               </a:ext>
               <a:ext uri="{C183D7F6-B498-43B3-948B-1728B52AA6E4}">
-                <adec:decorative xmlns:adec="http://schemas.microsoft.com/office/drawing/2017/decorative" xmlns="" val="1"/>
+                <adec:decorative xmlns="" xmlns:adec="http://schemas.microsoft.com/office/drawing/2017/decorative" val="1"/>
               </a:ext>
             </a:extLst>
           </p:cNvPr>
@@ -6080,7 +6080,7 @@
           <p:nvPr>
             <p:extLst>
               <p:ext uri="{386F3935-93C4-4BCD-93E2-E3B085C9AB24}">
-                <p16:designElem xmlns:p16="http://schemas.microsoft.com/office/powerpoint/2015/main" xmlns="" val="1"/>
+                <p16:designElem xmlns="" xmlns:p16="http://schemas.microsoft.com/office/powerpoint/2015/main" val="1"/>
               </p:ext>
             </p:extLst>
           </p:nvPr>
@@ -6127,10 +6127,10 @@
           <p:cNvPr id="11" name="Freeform: Shape 10">
             <a:extLst>
               <a:ext uri="{FF2B5EF4-FFF2-40B4-BE49-F238E27FC236}">
-                <a16:creationId xmlns:a16="http://schemas.microsoft.com/office/drawing/2014/main" xmlns="" id="{0AA6A048-501A-4387-906B-B8A8543E7B11}"/>
+                <a16:creationId xmlns="" xmlns:a16="http://schemas.microsoft.com/office/drawing/2014/main" id="{0AA6A048-501A-4387-906B-B8A8543E7B11}"/>
               </a:ext>
               <a:ext uri="{C183D7F6-B498-43B3-948B-1728B52AA6E4}">
-                <adec:decorative xmlns:adec="http://schemas.microsoft.com/office/drawing/2017/decorative" xmlns="" val="1"/>
+                <adec:decorative xmlns="" xmlns:adec="http://schemas.microsoft.com/office/drawing/2017/decorative" val="1"/>
               </a:ext>
             </a:extLst>
           </p:cNvPr>
@@ -6140,7 +6140,7 @@
           <p:nvPr>
             <p:extLst>
               <p:ext uri="{386F3935-93C4-4BCD-93E2-E3B085C9AB24}">
-                <p16:designElem xmlns:p16="http://schemas.microsoft.com/office/powerpoint/2015/main" xmlns="" val="1"/>
+                <p16:designElem xmlns="" xmlns:p16="http://schemas.microsoft.com/office/powerpoint/2015/main" val="1"/>
               </p:ext>
             </p:extLst>
           </p:nvPr>
@@ -6372,7 +6372,7 @@
           <p:cNvPr id="2" name="Заголовок 1">
             <a:extLst>
               <a:ext uri="{FF2B5EF4-FFF2-40B4-BE49-F238E27FC236}">
-                <a16:creationId xmlns:a16="http://schemas.microsoft.com/office/drawing/2014/main" xmlns="" id="{2ECCB3F8-B0A3-2AC8-E1BB-78CF6323C109}"/>
+                <a16:creationId xmlns="" xmlns:a16="http://schemas.microsoft.com/office/drawing/2014/main" id="{2ECCB3F8-B0A3-2AC8-E1BB-78CF6323C109}"/>
               </a:ext>
             </a:extLst>
           </p:cNvPr>
@@ -6438,7 +6438,7 @@
           <p:cNvPr id="3" name="Підзаголовок 2">
             <a:extLst>
               <a:ext uri="{FF2B5EF4-FFF2-40B4-BE49-F238E27FC236}">
-                <a16:creationId xmlns:a16="http://schemas.microsoft.com/office/drawing/2014/main" xmlns="" id="{E2FBA92C-E01C-B525-E491-351BB535A4B3}"/>
+                <a16:creationId xmlns="" xmlns:a16="http://schemas.microsoft.com/office/drawing/2014/main" id="{E2FBA92C-E01C-B525-E491-351BB535A4B3}"/>
               </a:ext>
             </a:extLst>
           </p:cNvPr>
@@ -7792,7 +7792,7 @@
             </a:r>
             <a:r>
               <a:rPr lang="ru-RU" b="1" dirty="0" err="1" smtClean="0"/>
-              <a:t>Легковаговикок</a:t>
+              <a:t>Легковаговик</a:t>
             </a:r>
             <a:r>
               <a:rPr lang="ru-RU" b="1" dirty="0" smtClean="0"/>
@@ -7839,7 +7839,7 @@
           <a:p>
             <a:r>
               <a:rPr lang="uk-UA" dirty="0" err="1" smtClean="0"/>
-              <a:t>Патерг</a:t>
+              <a:t>Патерн</a:t>
             </a:r>
             <a:r>
               <a:rPr lang="uk-UA" dirty="0" smtClean="0"/>
@@ -7888,12 +7888,12 @@
               <a:t>Може </a:t>
             </a:r>
             <a:r>
-              <a:rPr lang="uk-UA" dirty="0" err="1" smtClean="0"/>
-              <a:t>інувати</a:t>
-            </a:r>
-            <a:r>
               <a:rPr lang="uk-UA" dirty="0" smtClean="0"/>
-              <a:t> безліч об’єктів </a:t>
+              <a:t>існувати </a:t>
+            </a:r>
+            <a:r>
+              <a:rPr lang="uk-UA" dirty="0" smtClean="0"/>
+              <a:t>безліч об’єктів </a:t>
             </a:r>
             <a:r>
               <a:rPr lang="uk-UA" b="1" dirty="0" smtClean="0"/>
@@ -7976,7 +7976,7 @@
           <p:cNvPr id="2" name="Заголовок 1">
             <a:extLst>
               <a:ext uri="{FF2B5EF4-FFF2-40B4-BE49-F238E27FC236}">
-                <a16:creationId xmlns:a16="http://schemas.microsoft.com/office/drawing/2014/main" xmlns="" id="{F7D6161E-6479-9226-1FF8-A96FE1A1910C}"/>
+                <a16:creationId xmlns="" xmlns:a16="http://schemas.microsoft.com/office/drawing/2014/main" id="{F7D6161E-6479-9226-1FF8-A96FE1A1910C}"/>
               </a:ext>
             </a:extLst>
           </p:cNvPr>
@@ -8008,7 +8008,7 @@
           <p:cNvPr id="3" name="Підзаголовок 2">
             <a:extLst>
               <a:ext uri="{FF2B5EF4-FFF2-40B4-BE49-F238E27FC236}">
-                <a16:creationId xmlns:a16="http://schemas.microsoft.com/office/drawing/2014/main" xmlns="" id="{1EDA31C3-1203-9BD5-3CD7-417215408B3C}"/>
+                <a16:creationId xmlns="" xmlns:a16="http://schemas.microsoft.com/office/drawing/2014/main" id="{1EDA31C3-1203-9BD5-3CD7-417215408B3C}"/>
               </a:ext>
             </a:extLst>
           </p:cNvPr>
@@ -8126,7 +8126,7 @@
           <p:cNvPr id="2" name="Заголовок 1">
             <a:extLst>
               <a:ext uri="{FF2B5EF4-FFF2-40B4-BE49-F238E27FC236}">
-                <a16:creationId xmlns:a16="http://schemas.microsoft.com/office/drawing/2014/main" xmlns="" id="{8D8C1A49-90F8-5060-61FB-B6EF3C39F4F1}"/>
+                <a16:creationId xmlns="" xmlns:a16="http://schemas.microsoft.com/office/drawing/2014/main" id="{8D8C1A49-90F8-5060-61FB-B6EF3C39F4F1}"/>
               </a:ext>
             </a:extLst>
           </p:cNvPr>
@@ -8167,7 +8167,7 @@
           <p:cNvPr id="3" name="Місце для вмісту 2">
             <a:extLst>
               <a:ext uri="{FF2B5EF4-FFF2-40B4-BE49-F238E27FC236}">
-                <a16:creationId xmlns:a16="http://schemas.microsoft.com/office/drawing/2014/main" xmlns="" id="{D8625FFD-0C45-F56A-5453-161E275A7433}"/>
+                <a16:creationId xmlns="" xmlns:a16="http://schemas.microsoft.com/office/drawing/2014/main" id="{D8625FFD-0C45-F56A-5453-161E275A7433}"/>
               </a:ext>
             </a:extLst>
           </p:cNvPr>
@@ -8541,7 +8541,23 @@
             </a:r>
             <a:r>
               <a:rPr lang="uk-UA" dirty="0" smtClean="0"/>
-              <a:t> при запуску. Користувач може навіть не дійти до деяких із них, але ресурси все ж витрачаються. Чи можливо створити об’єкт екрану тільки тоді коли він потрібний та залишити той самий інтерфейс щоб не змінювати код в усіх місцях використання?</a:t>
+              <a:t> при запуску. Користувач може навіть не дійти до деяких із них, але ресурси все ж витрачаються. Чи можливо створити об’єкт </a:t>
+            </a:r>
+            <a:r>
+              <a:rPr lang="uk-UA" dirty="0" smtClean="0"/>
+              <a:t>екрана </a:t>
+            </a:r>
+            <a:r>
+              <a:rPr lang="uk-UA" dirty="0" smtClean="0"/>
+              <a:t>тільки тоді коли він потрібний та залишити той самий </a:t>
+            </a:r>
+            <a:r>
+              <a:rPr lang="uk-UA" dirty="0" smtClean="0"/>
+              <a:t>інтерфейс, щоб </a:t>
+            </a:r>
+            <a:r>
+              <a:rPr lang="uk-UA" dirty="0" smtClean="0"/>
+              <a:t>не змінювати код в усіх місцях використання?</a:t>
             </a:r>
             <a:endParaRPr lang="ru-RU" dirty="0"/>
           </a:p>
@@ -9186,7 +9202,7 @@
           <p:cNvPr id="2" name="Заголовок 1">
             <a:extLst>
               <a:ext uri="{FF2B5EF4-FFF2-40B4-BE49-F238E27FC236}">
-                <a16:creationId xmlns:a16="http://schemas.microsoft.com/office/drawing/2014/main" xmlns="" id="{F7D6161E-6479-9226-1FF8-A96FE1A1910C}"/>
+                <a16:creationId xmlns="" xmlns:a16="http://schemas.microsoft.com/office/drawing/2014/main" id="{F7D6161E-6479-9226-1FF8-A96FE1A1910C}"/>
               </a:ext>
             </a:extLst>
           </p:cNvPr>
@@ -9218,7 +9234,7 @@
           <p:cNvPr id="3" name="Підзаголовок 2">
             <a:extLst>
               <a:ext uri="{FF2B5EF4-FFF2-40B4-BE49-F238E27FC236}">
-                <a16:creationId xmlns:a16="http://schemas.microsoft.com/office/drawing/2014/main" xmlns="" id="{1EDA31C3-1203-9BD5-3CD7-417215408B3C}"/>
+                <a16:creationId xmlns="" xmlns:a16="http://schemas.microsoft.com/office/drawing/2014/main" id="{1EDA31C3-1203-9BD5-3CD7-417215408B3C}"/>
               </a:ext>
             </a:extLst>
           </p:cNvPr>
@@ -10352,11 +10368,11 @@
               <a:t> доступу (</a:t>
             </a:r>
             <a:r>
-              <a:rPr lang="ru-RU" dirty="0" err="1"/>
-              <a:t>захищаючий</a:t>
-            </a:r>
-            <a:r>
-              <a:rPr lang="ru-RU" dirty="0"/>
+              <a:rPr lang="ru-RU" dirty="0" err="1" smtClean="0"/>
+              <a:t>захисний</a:t>
+            </a:r>
+            <a:r>
+              <a:rPr lang="ru-RU" dirty="0" smtClean="0"/>
               <a:t> </a:t>
             </a:r>
             <a:r>
@@ -10664,7 +10680,11 @@
             </a:r>
             <a:r>
               <a:rPr lang="uk-UA" dirty="0" smtClean="0"/>
-              <a:t>додає нові обов’язки, в той час як </a:t>
+              <a:t>додає нові обов’язки, в той </a:t>
+            </a:r>
+            <a:r>
+              <a:rPr lang="uk-UA" dirty="0" smtClean="0"/>
+              <a:t>час, як </a:t>
             </a:r>
             <a:r>
               <a:rPr lang="uk-UA" b="1" dirty="0" smtClean="0"/>
@@ -10672,7 +10692,15 @@
             </a:r>
             <a:r>
               <a:rPr lang="uk-UA" dirty="0" smtClean="0"/>
-              <a:t>контролює доступ до сервісного об’єкту. Також </a:t>
+              <a:t>контролює доступ до сервісного </a:t>
+            </a:r>
+            <a:r>
+              <a:rPr lang="uk-UA" dirty="0" smtClean="0"/>
+              <a:t>об’єкта. </a:t>
+            </a:r>
+            <a:r>
+              <a:rPr lang="uk-UA" dirty="0" smtClean="0"/>
+              <a:t>Також </a:t>
             </a:r>
             <a:r>
               <a:rPr lang="ru-RU" b="1" dirty="0" err="1"/>
@@ -10908,7 +10936,7 @@
           <p:cNvPr id="2" name="Заголовок 1">
             <a:extLst>
               <a:ext uri="{FF2B5EF4-FFF2-40B4-BE49-F238E27FC236}">
-                <a16:creationId xmlns:a16="http://schemas.microsoft.com/office/drawing/2014/main" xmlns="" id="{8D8C1A49-90F8-5060-61FB-B6EF3C39F4F1}"/>
+                <a16:creationId xmlns="" xmlns:a16="http://schemas.microsoft.com/office/drawing/2014/main" id="{8D8C1A49-90F8-5060-61FB-B6EF3C39F4F1}"/>
               </a:ext>
             </a:extLst>
           </p:cNvPr>
@@ -10949,7 +10977,7 @@
           <p:cNvPr id="3" name="Місце для вмісту 2">
             <a:extLst>
               <a:ext uri="{FF2B5EF4-FFF2-40B4-BE49-F238E27FC236}">
-                <a16:creationId xmlns:a16="http://schemas.microsoft.com/office/drawing/2014/main" xmlns="" id="{D8625FFD-0C45-F56A-5453-161E275A7433}"/>
+                <a16:creationId xmlns="" xmlns:a16="http://schemas.microsoft.com/office/drawing/2014/main" id="{D8625FFD-0C45-F56A-5453-161E275A7433}"/>
               </a:ext>
             </a:extLst>
           </p:cNvPr>
@@ -11121,20 +11149,24 @@
               <a:t>В грі персонаж стрибає нескінченно вгору по </a:t>
             </a:r>
             <a:r>
-              <a:rPr lang="uk-UA" dirty="0" err="1" smtClean="0"/>
-              <a:t>плтаформах</a:t>
+              <a:rPr lang="uk-UA" dirty="0" smtClean="0"/>
+              <a:t>пл</a:t>
+            </a:r>
+            <a:r>
+              <a:rPr lang="uk-UA" dirty="0" smtClean="0"/>
+              <a:t>а</a:t>
+            </a:r>
+            <a:r>
+              <a:rPr lang="uk-UA" dirty="0" smtClean="0"/>
+              <a:t>тформах</a:t>
             </a:r>
             <a:r>
               <a:rPr lang="uk-UA" dirty="0" smtClean="0"/>
               <a:t>, які постійно з’являються над ним. У випадку коли кожна </a:t>
             </a:r>
             <a:r>
-              <a:rPr lang="uk-UA" dirty="0" err="1" smtClean="0"/>
-              <a:t>плафторма</a:t>
-            </a:r>
-            <a:r>
               <a:rPr lang="uk-UA" dirty="0" smtClean="0"/>
-              <a:t> </a:t>
+              <a:t>платформа </a:t>
             </a:r>
             <a:r>
               <a:rPr lang="uk-UA" dirty="0" err="1" smtClean="0"/>
@@ -11149,7 +11181,15 @@
             <a:pPr lvl="1"/>
             <a:r>
               <a:rPr lang="uk-UA" dirty="0" smtClean="0"/>
-              <a:t>Постійні звернення до диску для завантаження зображення</a:t>
+              <a:t>Постійні звернення до </a:t>
+            </a:r>
+            <a:r>
+              <a:rPr lang="uk-UA" dirty="0" smtClean="0"/>
+              <a:t>диска </a:t>
+            </a:r>
+            <a:r>
+              <a:rPr lang="uk-UA" dirty="0" smtClean="0"/>
+              <a:t>для завантаження зображення</a:t>
             </a:r>
           </a:p>
           <a:p>
@@ -11913,7 +11953,15 @@
           <a:p>
             <a:r>
               <a:rPr lang="uk-UA" dirty="0" smtClean="0"/>
-              <a:t>Що робити тоді коли з’явилася потреба у платформах із іншою текстурою?</a:t>
+              <a:t>Що робити тоді коли з’явилася потреба у платформах </a:t>
+            </a:r>
+            <a:r>
+              <a:rPr lang="uk-UA" dirty="0" smtClean="0"/>
+              <a:t>з </a:t>
+            </a:r>
+            <a:r>
+              <a:rPr lang="uk-UA" dirty="0" smtClean="0"/>
+              <a:t>іншою текстурою?</a:t>
             </a:r>
             <a:endParaRPr lang="ru-RU" dirty="0"/>
           </a:p>

</xml_diff>